<commit_message>
12. Deferred execution và lazy loading
</commit_message>
<xml_diff>
--- a/1. Document/Slides/12-Deferred execution và lazy loading.pptx
+++ b/1. Document/Slides/12-Deferred execution và lazy loading.pptx
@@ -211,7 +211,7 @@
           <a:p>
             <a:fld id="{749F7025-33D9-4E9F-9955-A14222A03D05}" type="datetimeFigureOut">
               <a:rPr lang="en-US" smtClean="0"/>
-              <a:t>8/17/2024</a:t>
+              <a:t>1/24/2025</a:t>
             </a:fld>
             <a:endParaRPr lang="en-US"/>
           </a:p>
@@ -522,7 +522,10 @@
           <a:bodyPr/>
           <a:lstStyle/>
           <a:p>
-            <a:endParaRPr lang="en-US" dirty="0"/>
+            <a:r>
+              <a:rPr lang="en-US" dirty="0"/>
+              <a:t>- Thực thi trì hoãn và tải chậm</a:t>
+            </a:r>
           </a:p>
         </p:txBody>
       </p:sp>
@@ -1043,7 +1046,7 @@
           <a:p>
             <a:fld id="{1ADF62C2-72EA-4953-A1D6-568F980002B8}" type="datetimeFigureOut">
               <a:rPr lang="en-US" smtClean="0"/>
-              <a:t>8/17/2024</a:t>
+              <a:t>1/24/2025</a:t>
             </a:fld>
             <a:endParaRPr lang="en-US"/>
           </a:p>
@@ -1211,7 +1214,7 @@
           <a:p>
             <a:fld id="{1ADF62C2-72EA-4953-A1D6-568F980002B8}" type="datetimeFigureOut">
               <a:rPr lang="en-US" smtClean="0"/>
-              <a:t>8/17/2024</a:t>
+              <a:t>1/24/2025</a:t>
             </a:fld>
             <a:endParaRPr lang="en-US"/>
           </a:p>
@@ -1389,7 +1392,7 @@
           <a:p>
             <a:fld id="{1ADF62C2-72EA-4953-A1D6-568F980002B8}" type="datetimeFigureOut">
               <a:rPr lang="en-US" smtClean="0"/>
-              <a:t>8/17/2024</a:t>
+              <a:t>1/24/2025</a:t>
             </a:fld>
             <a:endParaRPr lang="en-US"/>
           </a:p>
@@ -2021,7 +2024,7 @@
           <a:p>
             <a:fld id="{1ADF62C2-72EA-4953-A1D6-568F980002B8}" type="datetimeFigureOut">
               <a:rPr lang="en-US" smtClean="0"/>
-              <a:t>8/17/2024</a:t>
+              <a:t>1/24/2025</a:t>
             </a:fld>
             <a:endParaRPr lang="en-US"/>
           </a:p>
@@ -2306,7 +2309,7 @@
           <a:p>
             <a:fld id="{1ADF62C2-72EA-4953-A1D6-568F980002B8}" type="datetimeFigureOut">
               <a:rPr lang="en-US" smtClean="0"/>
-              <a:t>8/17/2024</a:t>
+              <a:t>1/24/2025</a:t>
             </a:fld>
             <a:endParaRPr lang="en-US"/>
           </a:p>
@@ -2725,7 +2728,7 @@
           <a:p>
             <a:fld id="{1ADF62C2-72EA-4953-A1D6-568F980002B8}" type="datetimeFigureOut">
               <a:rPr lang="en-US" smtClean="0"/>
-              <a:t>8/17/2024</a:t>
+              <a:t>1/24/2025</a:t>
             </a:fld>
             <a:endParaRPr lang="en-US"/>
           </a:p>
@@ -2842,7 +2845,7 @@
           <a:p>
             <a:fld id="{1ADF62C2-72EA-4953-A1D6-568F980002B8}" type="datetimeFigureOut">
               <a:rPr lang="en-US" smtClean="0"/>
-              <a:t>8/17/2024</a:t>
+              <a:t>1/24/2025</a:t>
             </a:fld>
             <a:endParaRPr lang="en-US"/>
           </a:p>
@@ -2937,7 +2940,7 @@
           <a:p>
             <a:fld id="{1ADF62C2-72EA-4953-A1D6-568F980002B8}" type="datetimeFigureOut">
               <a:rPr lang="en-US" smtClean="0"/>
-              <a:t>8/17/2024</a:t>
+              <a:t>1/24/2025</a:t>
             </a:fld>
             <a:endParaRPr lang="en-US"/>
           </a:p>
@@ -3212,7 +3215,7 @@
           <a:p>
             <a:fld id="{1ADF62C2-72EA-4953-A1D6-568F980002B8}" type="datetimeFigureOut">
               <a:rPr lang="en-US" smtClean="0"/>
-              <a:t>8/17/2024</a:t>
+              <a:t>1/24/2025</a:t>
             </a:fld>
             <a:endParaRPr lang="en-US"/>
           </a:p>
@@ -3464,7 +3467,7 @@
           <a:p>
             <a:fld id="{1ADF62C2-72EA-4953-A1D6-568F980002B8}" type="datetimeFigureOut">
               <a:rPr lang="en-US" smtClean="0"/>
-              <a:t>8/17/2024</a:t>
+              <a:t>1/24/2025</a:t>
             </a:fld>
             <a:endParaRPr lang="en-US"/>
           </a:p>
@@ -3675,7 +3678,7 @@
           <a:p>
             <a:fld id="{1ADF62C2-72EA-4953-A1D6-568F980002B8}" type="datetimeFigureOut">
               <a:rPr lang="en-US" smtClean="0"/>
-              <a:t>8/17/2024</a:t>
+              <a:t>1/24/2025</a:t>
             </a:fld>
             <a:endParaRPr lang="en-US"/>
           </a:p>
@@ -4216,7 +4219,7 @@
               <a:defRPr/>
             </a:pPr>
             <a:r>
-              <a:rPr lang="en-US" kern="0">
+              <a:rPr lang="en-US" kern="0" dirty="0">
                 <a:solidFill>
                   <a:srgbClr val="002060"/>
                 </a:solidFill>
@@ -4224,7 +4227,7 @@
               </a:rPr>
               <a:t>Deferred execution và lazy loading</a:t>
             </a:r>
-            <a:endParaRPr kumimoji="0" lang="en-US" sz="4800" b="1" i="0" u="none" strike="noStrike" kern="0" cap="none" spc="0" normalizeH="0" baseline="0" noProof="0">
+            <a:endParaRPr kumimoji="0" lang="en-US" sz="4800" b="1" i="0" u="none" strike="noStrike" kern="0" cap="none" spc="0" normalizeH="0" baseline="0" noProof="0" dirty="0">
               <a:ln>
                 <a:noFill/>
               </a:ln>

</xml_diff>